<commit_message>
Add PPT_model and pre_PPT
</commit_message>
<xml_diff>
--- a/papers/group14_image_defogging.pptx
+++ b/papers/group14_image_defogging.pptx
@@ -107,6 +107,11 @@
       </a:defRPr>
     </a:lvl9pPr>
   </p:defaultTextStyle>
+  <p:extLst>
+    <p:ext uri="{EFAFB233-063F-42B5-8137-9DF3F51BA10A}">
+      <p15:sldGuideLst xmlns:p15="http://schemas.microsoft.com/office/powerpoint/2012/main"/>
+    </p:ext>
+  </p:extLst>
 </p:presentation>
 </file>
 
@@ -3723,7 +3728,7 @@
           </a:ln>
           <a:extLst>
             <a:ext uri="{C572A759-6A51-4108-AA02-DFA0A04FC94B}">
-              <ma14:wrappingTextBoxFlag xmlns="" xmlns:ma14="http://schemas.microsoft.com/office/mac/drawingml/2011/main" val="1"/>
+              <ma14:wrappingTextBoxFlag xmlns:ma14="http://schemas.microsoft.com/office/mac/drawingml/2011/main" xmlns="" val="1"/>
             </a:ext>
           </a:extLst>
         </p:spPr>
@@ -3797,7 +3802,7 @@
             <a:effectLst/>
             <a:extLst>
               <a:ext uri="{C572A759-6A51-4108-AA02-DFA0A04FC94B}">
-                <ma14:wrappingTextBoxFlag xmlns="" xmlns:ma14="http://schemas.microsoft.com/office/mac/drawingml/2011/main" val="1"/>
+                <ma14:wrappingTextBoxFlag xmlns:ma14="http://schemas.microsoft.com/office/mac/drawingml/2011/main" xmlns="" val="1"/>
               </a:ext>
             </a:extLst>
           </p:spPr>
@@ -3872,7 +3877,7 @@
             <a:effectLst/>
             <a:extLst>
               <a:ext uri="{C572A759-6A51-4108-AA02-DFA0A04FC94B}">
-                <ma14:wrappingTextBoxFlag xmlns="" xmlns:ma14="http://schemas.microsoft.com/office/mac/drawingml/2011/main" val="1"/>
+                <ma14:wrappingTextBoxFlag xmlns:ma14="http://schemas.microsoft.com/office/mac/drawingml/2011/main" xmlns="" val="1"/>
               </a:ext>
             </a:extLst>
           </p:spPr>
@@ -4507,7 +4512,7 @@
           <a:effectLst/>
           <a:extLst>
             <a:ext uri="{C572A759-6A51-4108-AA02-DFA0A04FC94B}">
-              <ma14:wrappingTextBoxFlag xmlns="" xmlns:ma14="http://schemas.microsoft.com/office/mac/drawingml/2011/main" val="1"/>
+              <ma14:wrappingTextBoxFlag xmlns:ma14="http://schemas.microsoft.com/office/mac/drawingml/2011/main" xmlns="" val="1"/>
             </a:ext>
           </a:extLst>
         </p:spPr>
@@ -4565,13 +4570,13 @@
   <p:clrMapOvr>
     <a:masterClrMapping/>
   </p:clrMapOvr>
-  <mc:AlternateContent xmlns:mc="http://schemas.openxmlformats.org/markup-compatibility/2006">
-    <mc:Choice xmlns:p14="http://schemas.microsoft.com/office/powerpoint/2010/main" Requires="p14">
+  <mc:AlternateContent xmlns:mc="http://schemas.openxmlformats.org/markup-compatibility/2006" xmlns:p14="http://schemas.microsoft.com/office/powerpoint/2010/main">
+    <mc:Choice Requires="p14">
       <p:transition p14:dur="300">
         <p:fade/>
       </p:transition>
     </mc:Choice>
-    <mc:Fallback>
+    <mc:Fallback xmlns="">
       <p:transition>
         <p:fade/>
       </p:transition>
@@ -5374,7 +5379,7 @@
           </a:ln>
           <a:extLst>
             <a:ext uri="{C572A759-6A51-4108-AA02-DFA0A04FC94B}">
-              <ma14:wrappingTextBoxFlag xmlns="" xmlns:ma14="http://schemas.microsoft.com/office/mac/drawingml/2011/main" val="1"/>
+              <ma14:wrappingTextBoxFlag xmlns:ma14="http://schemas.microsoft.com/office/mac/drawingml/2011/main" xmlns="" val="1"/>
             </a:ext>
           </a:extLst>
         </p:spPr>
@@ -5539,7 +5544,7 @@
             </a:ln>
             <a:extLst>
               <a:ext uri="{C572A759-6A51-4108-AA02-DFA0A04FC94B}">
-                <ma14:wrappingTextBoxFlag xmlns="" xmlns:ma14="http://schemas.microsoft.com/office/mac/drawingml/2011/main" val="1"/>
+                <ma14:wrappingTextBoxFlag xmlns:ma14="http://schemas.microsoft.com/office/mac/drawingml/2011/main" xmlns="" val="1"/>
               </a:ext>
             </a:extLst>
           </p:spPr>
@@ -5596,7 +5601,7 @@
             </a:ln>
             <a:extLst>
               <a:ext uri="{C572A759-6A51-4108-AA02-DFA0A04FC94B}">
-                <ma14:wrappingTextBoxFlag xmlns="" xmlns:ma14="http://schemas.microsoft.com/office/mac/drawingml/2011/main" val="1"/>
+                <ma14:wrappingTextBoxFlag xmlns:ma14="http://schemas.microsoft.com/office/mac/drawingml/2011/main" xmlns="" val="1"/>
               </a:ext>
             </a:extLst>
           </p:spPr>
@@ -5654,7 +5659,7 @@
             </a:ln>
             <a:extLst>
               <a:ext uri="{C572A759-6A51-4108-AA02-DFA0A04FC94B}">
-                <ma14:wrappingTextBoxFlag xmlns="" xmlns:ma14="http://schemas.microsoft.com/office/mac/drawingml/2011/main" val="1"/>
+                <ma14:wrappingTextBoxFlag xmlns:ma14="http://schemas.microsoft.com/office/mac/drawingml/2011/main" xmlns="" val="1"/>
               </a:ext>
             </a:extLst>
           </p:spPr>
@@ -5858,13 +5863,13 @@
   <p:clrMapOvr>
     <a:masterClrMapping/>
   </p:clrMapOvr>
-  <mc:AlternateContent xmlns:mc="http://schemas.openxmlformats.org/markup-compatibility/2006">
-    <mc:Choice xmlns:p14="http://schemas.microsoft.com/office/powerpoint/2010/main" Requires="p14">
+  <mc:AlternateContent xmlns:mc="http://schemas.openxmlformats.org/markup-compatibility/2006" xmlns:p14="http://schemas.microsoft.com/office/powerpoint/2010/main">
+    <mc:Choice Requires="p14">
       <p:transition p14:dur="300">
         <p:fade/>
       </p:transition>
     </mc:Choice>
-    <mc:Fallback>
+    <mc:Fallback xmlns="">
       <p:transition>
         <p:fade/>
       </p:transition>
@@ -6218,7 +6223,7 @@
             </a:ln>
             <a:extLst>
               <a:ext uri="{C572A759-6A51-4108-AA02-DFA0A04FC94B}">
-                <ma14:wrappingTextBoxFlag xmlns="" xmlns:ma14="http://schemas.microsoft.com/office/mac/drawingml/2011/main" val="1"/>
+                <ma14:wrappingTextBoxFlag xmlns:ma14="http://schemas.microsoft.com/office/mac/drawingml/2011/main" xmlns="" val="1"/>
               </a:ext>
             </a:extLst>
           </p:spPr>
@@ -6266,7 +6271,7 @@
             </a:ln>
             <a:extLst>
               <a:ext uri="{C572A759-6A51-4108-AA02-DFA0A04FC94B}">
-                <ma14:wrappingTextBoxFlag xmlns="" xmlns:ma14="http://schemas.microsoft.com/office/mac/drawingml/2011/main" val="1"/>
+                <ma14:wrappingTextBoxFlag xmlns:ma14="http://schemas.microsoft.com/office/mac/drawingml/2011/main" xmlns="" val="1"/>
               </a:ext>
             </a:extLst>
           </p:spPr>
@@ -6381,7 +6386,7 @@
             </a:ln>
             <a:extLst>
               <a:ext uri="{C572A759-6A51-4108-AA02-DFA0A04FC94B}">
-                <ma14:wrappingTextBoxFlag xmlns="" xmlns:ma14="http://schemas.microsoft.com/office/mac/drawingml/2011/main" val="1"/>
+                <ma14:wrappingTextBoxFlag xmlns:ma14="http://schemas.microsoft.com/office/mac/drawingml/2011/main" xmlns="" val="1"/>
               </a:ext>
             </a:extLst>
           </p:spPr>
@@ -6429,7 +6434,7 @@
             </a:ln>
             <a:extLst>
               <a:ext uri="{C572A759-6A51-4108-AA02-DFA0A04FC94B}">
-                <ma14:wrappingTextBoxFlag xmlns="" xmlns:ma14="http://schemas.microsoft.com/office/mac/drawingml/2011/main" val="1"/>
+                <ma14:wrappingTextBoxFlag xmlns:ma14="http://schemas.microsoft.com/office/mac/drawingml/2011/main" xmlns="" val="1"/>
               </a:ext>
             </a:extLst>
           </p:spPr>
@@ -6544,7 +6549,7 @@
             </a:ln>
             <a:extLst>
               <a:ext uri="{C572A759-6A51-4108-AA02-DFA0A04FC94B}">
-                <ma14:wrappingTextBoxFlag xmlns="" xmlns:ma14="http://schemas.microsoft.com/office/mac/drawingml/2011/main" val="1"/>
+                <ma14:wrappingTextBoxFlag xmlns:ma14="http://schemas.microsoft.com/office/mac/drawingml/2011/main" xmlns="" val="1"/>
               </a:ext>
             </a:extLst>
           </p:spPr>
@@ -6592,7 +6597,7 @@
             </a:ln>
             <a:extLst>
               <a:ext uri="{C572A759-6A51-4108-AA02-DFA0A04FC94B}">
-                <ma14:wrappingTextBoxFlag xmlns="" xmlns:ma14="http://schemas.microsoft.com/office/mac/drawingml/2011/main" val="1"/>
+                <ma14:wrappingTextBoxFlag xmlns:ma14="http://schemas.microsoft.com/office/mac/drawingml/2011/main" xmlns="" val="1"/>
               </a:ext>
             </a:extLst>
           </p:spPr>
@@ -6787,13 +6792,13 @@
   <p:clrMapOvr>
     <a:masterClrMapping/>
   </p:clrMapOvr>
-  <mc:AlternateContent xmlns:mc="http://schemas.openxmlformats.org/markup-compatibility/2006">
-    <mc:Choice xmlns:p14="http://schemas.microsoft.com/office/powerpoint/2010/main" Requires="p14">
+  <mc:AlternateContent xmlns:mc="http://schemas.openxmlformats.org/markup-compatibility/2006" xmlns:p14="http://schemas.microsoft.com/office/powerpoint/2010/main">
+    <mc:Choice Requires="p14">
       <p:transition p14:dur="300">
         <p:fade/>
       </p:transition>
     </mc:Choice>
-    <mc:Fallback>
+    <mc:Fallback xmlns="">
       <p:transition>
         <p:fade/>
       </p:transition>
@@ -7284,7 +7289,7 @@
           </a:ln>
           <a:extLst>
             <a:ext uri="{C572A759-6A51-4108-AA02-DFA0A04FC94B}">
-              <ma14:wrappingTextBoxFlag xmlns="" xmlns:ma14="http://schemas.microsoft.com/office/mac/drawingml/2011/main" val="1"/>
+              <ma14:wrappingTextBoxFlag xmlns:ma14="http://schemas.microsoft.com/office/mac/drawingml/2011/main" xmlns="" val="1"/>
             </a:ext>
           </a:extLst>
         </p:spPr>
@@ -7351,7 +7356,7 @@
           </a:ln>
           <a:extLst>
             <a:ext uri="{C572A759-6A51-4108-AA02-DFA0A04FC94B}">
-              <ma14:wrappingTextBoxFlag xmlns="" xmlns:ma14="http://schemas.microsoft.com/office/mac/drawingml/2011/main" val="1"/>
+              <ma14:wrappingTextBoxFlag xmlns:ma14="http://schemas.microsoft.com/office/mac/drawingml/2011/main" xmlns="" val="1"/>
             </a:ext>
           </a:extLst>
         </p:spPr>
@@ -7434,6 +7439,152 @@
           </a:p>
         </p:txBody>
       </p:sp>
+      <p:pic>
+        <p:nvPicPr>
+          <p:cNvPr id="2" name="图片 1">
+            <a:extLst>
+              <a:ext uri="{FF2B5EF4-FFF2-40B4-BE49-F238E27FC236}">
+                <a16:creationId xmlns:a16="http://schemas.microsoft.com/office/drawing/2014/main" id="{00A86D65-0608-403C-B39D-6B60DAD8B0C1}"/>
+              </a:ext>
+            </a:extLst>
+          </p:cNvPr>
+          <p:cNvPicPr>
+            <a:picLocks noChangeAspect="1"/>
+          </p:cNvPicPr>
+          <p:nvPr/>
+        </p:nvPicPr>
+        <p:blipFill>
+          <a:blip r:embed="rId2"/>
+          <a:stretch>
+            <a:fillRect/>
+          </a:stretch>
+        </p:blipFill>
+        <p:spPr>
+          <a:xfrm>
+            <a:off x="1326561" y="2030184"/>
+            <a:ext cx="3981450" cy="495300"/>
+          </a:xfrm>
+          <a:prstGeom prst="rect">
+            <a:avLst/>
+          </a:prstGeom>
+        </p:spPr>
+      </p:pic>
+      <p:sp>
+        <p:nvSpPr>
+          <p:cNvPr id="3" name="文本框 2">
+            <a:extLst>
+              <a:ext uri="{FF2B5EF4-FFF2-40B4-BE49-F238E27FC236}">
+                <a16:creationId xmlns:a16="http://schemas.microsoft.com/office/drawing/2014/main" id="{D4C67F39-7201-41BD-83DF-97922C35A9E3}"/>
+              </a:ext>
+            </a:extLst>
+          </p:cNvPr>
+          <p:cNvSpPr txBox="1"/>
+          <p:nvPr/>
+        </p:nvSpPr>
+        <p:spPr>
+          <a:xfrm>
+            <a:off x="510537" y="1484894"/>
+            <a:ext cx="2161169" cy="461665"/>
+          </a:xfrm>
+          <a:prstGeom prst="rect">
+            <a:avLst/>
+          </a:prstGeom>
+          <a:noFill/>
+        </p:spPr>
+        <p:txBody>
+          <a:bodyPr wrap="none" rtlCol="0">
+            <a:spAutoFit/>
+          </a:bodyPr>
+          <a:lstStyle/>
+          <a:p>
+            <a:r>
+              <a:rPr lang="en-US" altLang="zh-CN" sz="2400" b="1" dirty="0">
+                <a:latin typeface="Georgia" panose="02040502050405020303" pitchFamily="18" charset="0"/>
+              </a:rPr>
+              <a:t>The model</a:t>
+            </a:r>
+            <a:r>
+              <a:rPr lang="zh-CN" altLang="en-US" sz="2400" b="1" dirty="0">
+                <a:latin typeface="Georgia" panose="02040502050405020303" pitchFamily="18" charset="0"/>
+              </a:rPr>
+              <a:t>：</a:t>
+            </a:r>
+          </a:p>
+        </p:txBody>
+      </p:sp>
+      <p:sp>
+        <p:nvSpPr>
+          <p:cNvPr id="10" name="文本框 9">
+            <a:extLst>
+              <a:ext uri="{FF2B5EF4-FFF2-40B4-BE49-F238E27FC236}">
+                <a16:creationId xmlns:a16="http://schemas.microsoft.com/office/drawing/2014/main" id="{89BA9488-9E8F-49A1-804A-84A0D02E84D2}"/>
+              </a:ext>
+            </a:extLst>
+          </p:cNvPr>
+          <p:cNvSpPr txBox="1"/>
+          <p:nvPr/>
+        </p:nvSpPr>
+        <p:spPr>
+          <a:xfrm>
+            <a:off x="441430" y="2718882"/>
+            <a:ext cx="2540481" cy="461665"/>
+          </a:xfrm>
+          <a:prstGeom prst="rect">
+            <a:avLst/>
+          </a:prstGeom>
+          <a:noFill/>
+        </p:spPr>
+        <p:txBody>
+          <a:bodyPr wrap="square" rtlCol="0">
+            <a:spAutoFit/>
+          </a:bodyPr>
+          <a:lstStyle/>
+          <a:p>
+            <a:r>
+              <a:rPr lang="en-US" altLang="zh-CN" sz="2400" b="1" dirty="0">
+                <a:latin typeface="Georgia" panose="02040502050405020303" pitchFamily="18" charset="0"/>
+              </a:rPr>
+              <a:t> Dark channel</a:t>
+            </a:r>
+            <a:r>
+              <a:rPr lang="zh-CN" altLang="en-US" sz="2400" b="1" dirty="0">
+                <a:latin typeface="Georgia" panose="02040502050405020303" pitchFamily="18" charset="0"/>
+              </a:rPr>
+              <a:t>：</a:t>
+            </a:r>
+          </a:p>
+        </p:txBody>
+      </p:sp>
+      <p:pic>
+        <p:nvPicPr>
+          <p:cNvPr id="4" name="图片 3">
+            <a:extLst>
+              <a:ext uri="{FF2B5EF4-FFF2-40B4-BE49-F238E27FC236}">
+                <a16:creationId xmlns:a16="http://schemas.microsoft.com/office/drawing/2014/main" id="{41840B67-DA60-4918-ABEB-FAF57A3CE707}"/>
+              </a:ext>
+            </a:extLst>
+          </p:cNvPr>
+          <p:cNvPicPr>
+            <a:picLocks noChangeAspect="1"/>
+          </p:cNvPicPr>
+          <p:nvPr/>
+        </p:nvPicPr>
+        <p:blipFill>
+          <a:blip r:embed="rId3"/>
+          <a:stretch>
+            <a:fillRect/>
+          </a:stretch>
+        </p:blipFill>
+        <p:spPr>
+          <a:xfrm>
+            <a:off x="1326561" y="3345943"/>
+            <a:ext cx="3981450" cy="697480"/>
+          </a:xfrm>
+          <a:prstGeom prst="rect">
+            <a:avLst/>
+          </a:prstGeom>
+        </p:spPr>
+      </p:pic>
     </p:spTree>
     <p:extLst>
       <p:ext uri="{BB962C8B-B14F-4D97-AF65-F5344CB8AC3E}">
@@ -7444,13 +7595,13 @@
   <p:clrMapOvr>
     <a:masterClrMapping/>
   </p:clrMapOvr>
-  <mc:AlternateContent xmlns:mc="http://schemas.openxmlformats.org/markup-compatibility/2006">
-    <mc:Choice xmlns:p14="http://schemas.microsoft.com/office/powerpoint/2010/main" Requires="p14">
+  <mc:AlternateContent xmlns:mc="http://schemas.openxmlformats.org/markup-compatibility/2006" xmlns:p14="http://schemas.microsoft.com/office/powerpoint/2010/main">
+    <mc:Choice Requires="p14">
       <p:transition p14:dur="300">
         <p:fade/>
       </p:transition>
     </mc:Choice>
-    <mc:Fallback>
+    <mc:Fallback xmlns="">
       <p:transition>
         <p:fade/>
       </p:transition>
@@ -7744,6 +7895,146 @@
                                   </p:childTnLst>
                                 </p:cTn>
                               </p:par>
+                              <p:par>
+                                <p:cTn id="21" presetID="10" presetClass="entr" presetSubtype="0" fill="hold" grpId="0" nodeType="withEffect">
+                                  <p:stCondLst>
+                                    <p:cond delay="0"/>
+                                  </p:stCondLst>
+                                  <p:childTnLst>
+                                    <p:set>
+                                      <p:cBhvr>
+                                        <p:cTn id="22" dur="1" fill="hold">
+                                          <p:stCondLst>
+                                            <p:cond delay="0"/>
+                                          </p:stCondLst>
+                                        </p:cTn>
+                                        <p:tgtEl>
+                                          <p:spTgt spid="3"/>
+                                        </p:tgtEl>
+                                        <p:attrNameLst>
+                                          <p:attrName>style.visibility</p:attrName>
+                                        </p:attrNameLst>
+                                      </p:cBhvr>
+                                      <p:to>
+                                        <p:strVal val="visible"/>
+                                      </p:to>
+                                    </p:set>
+                                    <p:animEffect transition="in" filter="fade">
+                                      <p:cBhvr>
+                                        <p:cTn id="23" dur="500"/>
+                                        <p:tgtEl>
+                                          <p:spTgt spid="3"/>
+                                        </p:tgtEl>
+                                      </p:cBhvr>
+                                    </p:animEffect>
+                                  </p:childTnLst>
+                                </p:cTn>
+                              </p:par>
+                              <p:par>
+                                <p:cTn id="24" presetID="10" presetClass="entr" presetSubtype="0" fill="hold" nodeType="withEffect">
+                                  <p:stCondLst>
+                                    <p:cond delay="0"/>
+                                  </p:stCondLst>
+                                  <p:childTnLst>
+                                    <p:set>
+                                      <p:cBhvr>
+                                        <p:cTn id="25" dur="1" fill="hold">
+                                          <p:stCondLst>
+                                            <p:cond delay="0"/>
+                                          </p:stCondLst>
+                                        </p:cTn>
+                                        <p:tgtEl>
+                                          <p:spTgt spid="2"/>
+                                        </p:tgtEl>
+                                        <p:attrNameLst>
+                                          <p:attrName>style.visibility</p:attrName>
+                                        </p:attrNameLst>
+                                      </p:cBhvr>
+                                      <p:to>
+                                        <p:strVal val="visible"/>
+                                      </p:to>
+                                    </p:set>
+                                    <p:animEffect transition="in" filter="fade">
+                                      <p:cBhvr>
+                                        <p:cTn id="26" dur="500"/>
+                                        <p:tgtEl>
+                                          <p:spTgt spid="2"/>
+                                        </p:tgtEl>
+                                      </p:cBhvr>
+                                    </p:animEffect>
+                                  </p:childTnLst>
+                                </p:cTn>
+                              </p:par>
+                              <p:par>
+                                <p:cTn id="27" presetID="10" presetClass="entr" presetSubtype="0" fill="hold" grpId="0" nodeType="withEffect">
+                                  <p:stCondLst>
+                                    <p:cond delay="0"/>
+                                  </p:stCondLst>
+                                  <p:childTnLst>
+                                    <p:set>
+                                      <p:cBhvr>
+                                        <p:cTn id="28" dur="1" fill="hold">
+                                          <p:stCondLst>
+                                            <p:cond delay="0"/>
+                                          </p:stCondLst>
+                                        </p:cTn>
+                                        <p:tgtEl>
+                                          <p:spTgt spid="10"/>
+                                        </p:tgtEl>
+                                        <p:attrNameLst>
+                                          <p:attrName>style.visibility</p:attrName>
+                                        </p:attrNameLst>
+                                      </p:cBhvr>
+                                      <p:to>
+                                        <p:strVal val="visible"/>
+                                      </p:to>
+                                    </p:set>
+                                    <p:animEffect transition="in" filter="fade">
+                                      <p:cBhvr>
+                                        <p:cTn id="29" dur="500"/>
+                                        <p:tgtEl>
+                                          <p:spTgt spid="10"/>
+                                        </p:tgtEl>
+                                      </p:cBhvr>
+                                    </p:animEffect>
+                                  </p:childTnLst>
+                                </p:cTn>
+                              </p:par>
+                              <p:par>
+                                <p:cTn id="30" presetID="10" presetClass="entr" presetSubtype="0" fill="hold" nodeType="withEffect">
+                                  <p:stCondLst>
+                                    <p:cond delay="0"/>
+                                  </p:stCondLst>
+                                  <p:childTnLst>
+                                    <p:set>
+                                      <p:cBhvr>
+                                        <p:cTn id="31" dur="1" fill="hold">
+                                          <p:stCondLst>
+                                            <p:cond delay="0"/>
+                                          </p:stCondLst>
+                                        </p:cTn>
+                                        <p:tgtEl>
+                                          <p:spTgt spid="4"/>
+                                        </p:tgtEl>
+                                        <p:attrNameLst>
+                                          <p:attrName>style.visibility</p:attrName>
+                                        </p:attrNameLst>
+                                      </p:cBhvr>
+                                      <p:to>
+                                        <p:strVal val="visible"/>
+                                      </p:to>
+                                    </p:set>
+                                    <p:animEffect transition="in" filter="fade">
+                                      <p:cBhvr>
+                                        <p:cTn id="32" dur="500"/>
+                                        <p:tgtEl>
+                                          <p:spTgt spid="4"/>
+                                        </p:tgtEl>
+                                      </p:cBhvr>
+                                    </p:animEffect>
+                                  </p:childTnLst>
+                                </p:cTn>
+                              </p:par>
                             </p:childTnLst>
                           </p:cTn>
                         </p:par>
@@ -7776,6 +8067,8 @@
       <p:bldP spid="158" grpId="0" animBg="1"/>
       <p:bldP spid="17" grpId="0" animBg="1"/>
       <p:bldP spid="18" grpId="0" animBg="1"/>
+      <p:bldP spid="3" grpId="0"/>
+      <p:bldP spid="10" grpId="0"/>
     </p:bldLst>
   </p:timing>
 </p:sld>

</xml_diff>